<commit_message>
added initial file input design to admin page
</commit_message>
<xml_diff>
--- a/design/Desktop_Wireframes.pptx
+++ b/design/Desktop_Wireframes.pptx
@@ -117,6 +117,107 @@
 </p:presentation>
 </file>
 
+<file path=ppt/revisionInfo.xml><?xml version="1.0" encoding="utf-8"?>
+<p1510:revInfo xmlns:a="http://schemas.openxmlformats.org/drawingml/2006/main" xmlns:r="http://schemas.openxmlformats.org/officeDocument/2006/relationships" xmlns:p1510="http://schemas.microsoft.com/office/powerpoint/2015/10/main">
+  <p1510:revLst>
+    <p1510:client id="{030B8971-D5A0-4560-9A60-4F6C89E24465}" v="5" dt="2023-02-28T16:38:45.751"/>
+  </p1510:revLst>
+</p1510:revInfo>
+</file>
+
+<file path=ppt/changesInfos/changesInfo1.xml><?xml version="1.0" encoding="utf-8"?>
+<pc:chgInfo xmlns:a="http://schemas.openxmlformats.org/drawingml/2006/main" xmlns:r="http://schemas.openxmlformats.org/officeDocument/2006/relationships" xmlns:ac="http://schemas.microsoft.com/office/drawing/2013/main/command" xmlns:pc="http://schemas.microsoft.com/office/powerpoint/2013/main/command">
+  <pc:docChgLst>
+    <pc:chgData name="dave hussey" userId="4b3ea77912a5158e" providerId="LiveId" clId="{030B8971-D5A0-4560-9A60-4F6C89E24465}"/>
+    <pc:docChg chg="modSld">
+      <pc:chgData name="dave hussey" userId="4b3ea77912a5158e" providerId="LiveId" clId="{030B8971-D5A0-4560-9A60-4F6C89E24465}" dt="2023-02-28T16:40:31.838" v="176" actId="20577"/>
+      <pc:docMkLst>
+        <pc:docMk/>
+      </pc:docMkLst>
+      <pc:sldChg chg="addSp modSp mod">
+        <pc:chgData name="dave hussey" userId="4b3ea77912a5158e" providerId="LiveId" clId="{030B8971-D5A0-4560-9A60-4F6C89E24465}" dt="2023-02-28T16:40:31.838" v="176" actId="20577"/>
+        <pc:sldMkLst>
+          <pc:docMk/>
+          <pc:sldMk cId="2097583108" sldId="259"/>
+        </pc:sldMkLst>
+        <pc:spChg chg="add mod">
+          <ac:chgData name="dave hussey" userId="4b3ea77912a5158e" providerId="LiveId" clId="{030B8971-D5A0-4560-9A60-4F6C89E24465}" dt="2023-02-28T16:38:21.619" v="37" actId="14100"/>
+          <ac:spMkLst>
+            <pc:docMk/>
+            <pc:sldMk cId="2097583108" sldId="259"/>
+            <ac:spMk id="2" creationId="{D0F5EE76-7DA8-4462-C716-C4DC7AD19D01}"/>
+          </ac:spMkLst>
+        </pc:spChg>
+        <pc:spChg chg="mod">
+          <ac:chgData name="dave hussey" userId="4b3ea77912a5158e" providerId="LiveId" clId="{030B8971-D5A0-4560-9A60-4F6C89E24465}" dt="2023-02-28T16:39:55.122" v="139" actId="1076"/>
+          <ac:spMkLst>
+            <pc:docMk/>
+            <pc:sldMk cId="2097583108" sldId="259"/>
+            <ac:spMk id="3" creationId="{00000000-0000-0000-0000-000000000000}"/>
+          </ac:spMkLst>
+        </pc:spChg>
+        <pc:spChg chg="mod">
+          <ac:chgData name="dave hussey" userId="4b3ea77912a5158e" providerId="LiveId" clId="{030B8971-D5A0-4560-9A60-4F6C89E24465}" dt="2023-02-28T16:38:12.524" v="35" actId="1076"/>
+          <ac:spMkLst>
+            <pc:docMk/>
+            <pc:sldMk cId="2097583108" sldId="259"/>
+            <ac:spMk id="4" creationId="{00000000-0000-0000-0000-000000000000}"/>
+          </ac:spMkLst>
+        </pc:spChg>
+        <pc:spChg chg="add mod">
+          <ac:chgData name="dave hussey" userId="4b3ea77912a5158e" providerId="LiveId" clId="{030B8971-D5A0-4560-9A60-4F6C89E24465}" dt="2023-02-28T16:39:46.519" v="137" actId="1076"/>
+          <ac:spMkLst>
+            <pc:docMk/>
+            <pc:sldMk cId="2097583108" sldId="259"/>
+            <ac:spMk id="10" creationId="{F187ECB0-C4DF-F9C6-AD37-50284408D5A9}"/>
+          </ac:spMkLst>
+        </pc:spChg>
+        <pc:spChg chg="mod">
+          <ac:chgData name="dave hussey" userId="4b3ea77912a5158e" providerId="LiveId" clId="{030B8971-D5A0-4560-9A60-4F6C89E24465}" dt="2023-02-28T16:39:44.619" v="136" actId="1076"/>
+          <ac:spMkLst>
+            <pc:docMk/>
+            <pc:sldMk cId="2097583108" sldId="259"/>
+            <ac:spMk id="11" creationId="{00000000-0000-0000-0000-000000000000}"/>
+          </ac:spMkLst>
+        </pc:spChg>
+        <pc:spChg chg="add mod">
+          <ac:chgData name="dave hussey" userId="4b3ea77912a5158e" providerId="LiveId" clId="{030B8971-D5A0-4560-9A60-4F6C89E24465}" dt="2023-02-28T16:39:49.714" v="138" actId="1076"/>
+          <ac:spMkLst>
+            <pc:docMk/>
+            <pc:sldMk cId="2097583108" sldId="259"/>
+            <ac:spMk id="12" creationId="{609F73AA-5083-DB21-3A6C-047B2C265A02}"/>
+          </ac:spMkLst>
+        </pc:spChg>
+        <pc:spChg chg="mod">
+          <ac:chgData name="dave hussey" userId="4b3ea77912a5158e" providerId="LiveId" clId="{030B8971-D5A0-4560-9A60-4F6C89E24465}" dt="2023-02-28T16:38:15.972" v="36" actId="14100"/>
+          <ac:spMkLst>
+            <pc:docMk/>
+            <pc:sldMk cId="2097583108" sldId="259"/>
+            <ac:spMk id="13" creationId="{00000000-0000-0000-0000-000000000000}"/>
+          </ac:spMkLst>
+        </pc:spChg>
+        <pc:spChg chg="add mod">
+          <ac:chgData name="dave hussey" userId="4b3ea77912a5158e" providerId="LiveId" clId="{030B8971-D5A0-4560-9A60-4F6C89E24465}" dt="2023-02-28T16:40:31.838" v="176" actId="20577"/>
+          <ac:spMkLst>
+            <pc:docMk/>
+            <pc:sldMk cId="2097583108" sldId="259"/>
+            <ac:spMk id="14" creationId="{F76AB3CF-E280-38EF-B09F-769CCF414B0A}"/>
+          </ac:spMkLst>
+        </pc:spChg>
+        <pc:spChg chg="add mod">
+          <ac:chgData name="dave hussey" userId="4b3ea77912a5158e" providerId="LiveId" clId="{030B8971-D5A0-4560-9A60-4F6C89E24465}" dt="2023-02-28T16:40:13.508" v="142" actId="1076"/>
+          <ac:spMkLst>
+            <pc:docMk/>
+            <pc:sldMk cId="2097583108" sldId="259"/>
+            <ac:spMk id="15" creationId="{92FC55FF-963D-1D8B-77AF-6C197F3B4455}"/>
+          </ac:spMkLst>
+        </pc:spChg>
+      </pc:sldChg>
+    </pc:docChg>
+  </pc:docChgLst>
+</pc:chgInfo>
+</file>
+
 <file path=ppt/slideLayouts/slideLayout1.xml><?xml version="1.0" encoding="utf-8"?>
 <p:sldLayout xmlns:a="http://schemas.openxmlformats.org/drawingml/2006/main" xmlns:r="http://schemas.openxmlformats.org/officeDocument/2006/relationships" xmlns:p="http://schemas.openxmlformats.org/presentationml/2006/main" type="title" preserve="1">
   <p:cSld name="Title Slide">
@@ -159,7 +260,7 @@
           </a:lstStyle>
           <a:p>
             <a:r>
-              <a:rPr lang="en-US" smtClean="0"/>
+              <a:rPr lang="en-US"/>
               <a:t>Click to edit Master title style</a:t>
             </a:r>
             <a:endParaRPr lang="en-GB"/>
@@ -224,7 +325,7 @@
           </a:lstStyle>
           <a:p>
             <a:r>
-              <a:rPr lang="en-US" smtClean="0"/>
+              <a:rPr lang="en-US"/>
               <a:t>Click to edit Master subtitle style</a:t>
             </a:r>
             <a:endParaRPr lang="en-GB"/>
@@ -248,7 +349,7 @@
           <a:p>
             <a:fld id="{4C769064-28F3-4829-9F80-93AB9647D7ED}" type="datetimeFigureOut">
               <a:rPr lang="en-GB" smtClean="0"/>
-              <a:t>25/02/2023</a:t>
+              <a:t>28/02/2023</a:t>
             </a:fld>
             <a:endParaRPr lang="en-GB"/>
           </a:p>
@@ -342,7 +443,7 @@
           <a:lstStyle/>
           <a:p>
             <a:r>
-              <a:rPr lang="en-US" smtClean="0"/>
+              <a:rPr lang="en-US"/>
               <a:t>Click to edit Master title style</a:t>
             </a:r>
             <a:endParaRPr lang="en-GB"/>
@@ -366,35 +467,35 @@
           <a:p>
             <a:pPr lvl="0"/>
             <a:r>
-              <a:rPr lang="en-US" smtClean="0"/>
+              <a:rPr lang="en-US"/>
               <a:t>Edit Master text styles</a:t>
             </a:r>
           </a:p>
           <a:p>
             <a:pPr lvl="1"/>
             <a:r>
-              <a:rPr lang="en-US" smtClean="0"/>
+              <a:rPr lang="en-US"/>
               <a:t>Second level</a:t>
             </a:r>
           </a:p>
           <a:p>
             <a:pPr lvl="2"/>
             <a:r>
-              <a:rPr lang="en-US" smtClean="0"/>
+              <a:rPr lang="en-US"/>
               <a:t>Third level</a:t>
             </a:r>
           </a:p>
           <a:p>
             <a:pPr lvl="3"/>
             <a:r>
-              <a:rPr lang="en-US" smtClean="0"/>
+              <a:rPr lang="en-US"/>
               <a:t>Fourth level</a:t>
             </a:r>
           </a:p>
           <a:p>
             <a:pPr lvl="4"/>
             <a:r>
-              <a:rPr lang="en-US" smtClean="0"/>
+              <a:rPr lang="en-US"/>
               <a:t>Fifth level</a:t>
             </a:r>
             <a:endParaRPr lang="en-GB"/>
@@ -418,7 +519,7 @@
           <a:p>
             <a:fld id="{4C769064-28F3-4829-9F80-93AB9647D7ED}" type="datetimeFigureOut">
               <a:rPr lang="en-GB" smtClean="0"/>
-              <a:t>25/02/2023</a:t>
+              <a:t>28/02/2023</a:t>
             </a:fld>
             <a:endParaRPr lang="en-GB"/>
           </a:p>
@@ -517,7 +618,7 @@
           <a:lstStyle/>
           <a:p>
             <a:r>
-              <a:rPr lang="en-US" smtClean="0"/>
+              <a:rPr lang="en-US"/>
               <a:t>Click to edit Master title style</a:t>
             </a:r>
             <a:endParaRPr lang="en-GB"/>
@@ -546,35 +647,35 @@
           <a:p>
             <a:pPr lvl="0"/>
             <a:r>
-              <a:rPr lang="en-US" smtClean="0"/>
+              <a:rPr lang="en-US"/>
               <a:t>Edit Master text styles</a:t>
             </a:r>
           </a:p>
           <a:p>
             <a:pPr lvl="1"/>
             <a:r>
-              <a:rPr lang="en-US" smtClean="0"/>
+              <a:rPr lang="en-US"/>
               <a:t>Second level</a:t>
             </a:r>
           </a:p>
           <a:p>
             <a:pPr lvl="2"/>
             <a:r>
-              <a:rPr lang="en-US" smtClean="0"/>
+              <a:rPr lang="en-US"/>
               <a:t>Third level</a:t>
             </a:r>
           </a:p>
           <a:p>
             <a:pPr lvl="3"/>
             <a:r>
-              <a:rPr lang="en-US" smtClean="0"/>
+              <a:rPr lang="en-US"/>
               <a:t>Fourth level</a:t>
             </a:r>
           </a:p>
           <a:p>
             <a:pPr lvl="4"/>
             <a:r>
-              <a:rPr lang="en-US" smtClean="0"/>
+              <a:rPr lang="en-US"/>
               <a:t>Fifth level</a:t>
             </a:r>
             <a:endParaRPr lang="en-GB"/>
@@ -598,7 +699,7 @@
           <a:p>
             <a:fld id="{4C769064-28F3-4829-9F80-93AB9647D7ED}" type="datetimeFigureOut">
               <a:rPr lang="en-GB" smtClean="0"/>
-              <a:t>25/02/2023</a:t>
+              <a:t>28/02/2023</a:t>
             </a:fld>
             <a:endParaRPr lang="en-GB"/>
           </a:p>
@@ -692,7 +793,7 @@
           <a:lstStyle/>
           <a:p>
             <a:r>
-              <a:rPr lang="en-US" smtClean="0"/>
+              <a:rPr lang="en-US"/>
               <a:t>Click to edit Master title style</a:t>
             </a:r>
             <a:endParaRPr lang="en-GB"/>
@@ -716,35 +817,35 @@
           <a:p>
             <a:pPr lvl="0"/>
             <a:r>
-              <a:rPr lang="en-US" smtClean="0"/>
+              <a:rPr lang="en-US"/>
               <a:t>Edit Master text styles</a:t>
             </a:r>
           </a:p>
           <a:p>
             <a:pPr lvl="1"/>
             <a:r>
-              <a:rPr lang="en-US" smtClean="0"/>
+              <a:rPr lang="en-US"/>
               <a:t>Second level</a:t>
             </a:r>
           </a:p>
           <a:p>
             <a:pPr lvl="2"/>
             <a:r>
-              <a:rPr lang="en-US" smtClean="0"/>
+              <a:rPr lang="en-US"/>
               <a:t>Third level</a:t>
             </a:r>
           </a:p>
           <a:p>
             <a:pPr lvl="3"/>
             <a:r>
-              <a:rPr lang="en-US" smtClean="0"/>
+              <a:rPr lang="en-US"/>
               <a:t>Fourth level</a:t>
             </a:r>
           </a:p>
           <a:p>
             <a:pPr lvl="4"/>
             <a:r>
-              <a:rPr lang="en-US" smtClean="0"/>
+              <a:rPr lang="en-US"/>
               <a:t>Fifth level</a:t>
             </a:r>
             <a:endParaRPr lang="en-GB"/>
@@ -768,7 +869,7 @@
           <a:p>
             <a:fld id="{4C769064-28F3-4829-9F80-93AB9647D7ED}" type="datetimeFigureOut">
               <a:rPr lang="en-GB" smtClean="0"/>
-              <a:t>25/02/2023</a:t>
+              <a:t>28/02/2023</a:t>
             </a:fld>
             <a:endParaRPr lang="en-GB"/>
           </a:p>
@@ -871,7 +972,7 @@
           </a:lstStyle>
           <a:p>
             <a:r>
-              <a:rPr lang="en-US" smtClean="0"/>
+              <a:rPr lang="en-US"/>
               <a:t>Click to edit Master title style</a:t>
             </a:r>
             <a:endParaRPr lang="en-GB"/>
@@ -991,7 +1092,7 @@
           <a:p>
             <a:pPr lvl="0"/>
             <a:r>
-              <a:rPr lang="en-US" smtClean="0"/>
+              <a:rPr lang="en-US"/>
               <a:t>Edit Master text styles</a:t>
             </a:r>
           </a:p>
@@ -1014,7 +1115,7 @@
           <a:p>
             <a:fld id="{4C769064-28F3-4829-9F80-93AB9647D7ED}" type="datetimeFigureOut">
               <a:rPr lang="en-GB" smtClean="0"/>
-              <a:t>25/02/2023</a:t>
+              <a:t>28/02/2023</a:t>
             </a:fld>
             <a:endParaRPr lang="en-GB"/>
           </a:p>
@@ -1108,7 +1209,7 @@
           <a:lstStyle/>
           <a:p>
             <a:r>
-              <a:rPr lang="en-US" smtClean="0"/>
+              <a:rPr lang="en-US"/>
               <a:t>Click to edit Master title style</a:t>
             </a:r>
             <a:endParaRPr lang="en-GB"/>
@@ -1137,35 +1238,35 @@
           <a:p>
             <a:pPr lvl="0"/>
             <a:r>
-              <a:rPr lang="en-US" smtClean="0"/>
+              <a:rPr lang="en-US"/>
               <a:t>Edit Master text styles</a:t>
             </a:r>
           </a:p>
           <a:p>
             <a:pPr lvl="1"/>
             <a:r>
-              <a:rPr lang="en-US" smtClean="0"/>
+              <a:rPr lang="en-US"/>
               <a:t>Second level</a:t>
             </a:r>
           </a:p>
           <a:p>
             <a:pPr lvl="2"/>
             <a:r>
-              <a:rPr lang="en-US" smtClean="0"/>
+              <a:rPr lang="en-US"/>
               <a:t>Third level</a:t>
             </a:r>
           </a:p>
           <a:p>
             <a:pPr lvl="3"/>
             <a:r>
-              <a:rPr lang="en-US" smtClean="0"/>
+              <a:rPr lang="en-US"/>
               <a:t>Fourth level</a:t>
             </a:r>
           </a:p>
           <a:p>
             <a:pPr lvl="4"/>
             <a:r>
-              <a:rPr lang="en-US" smtClean="0"/>
+              <a:rPr lang="en-US"/>
               <a:t>Fifth level</a:t>
             </a:r>
             <a:endParaRPr lang="en-GB"/>
@@ -1194,35 +1295,35 @@
           <a:p>
             <a:pPr lvl="0"/>
             <a:r>
-              <a:rPr lang="en-US" smtClean="0"/>
+              <a:rPr lang="en-US"/>
               <a:t>Edit Master text styles</a:t>
             </a:r>
           </a:p>
           <a:p>
             <a:pPr lvl="1"/>
             <a:r>
-              <a:rPr lang="en-US" smtClean="0"/>
+              <a:rPr lang="en-US"/>
               <a:t>Second level</a:t>
             </a:r>
           </a:p>
           <a:p>
             <a:pPr lvl="2"/>
             <a:r>
-              <a:rPr lang="en-US" smtClean="0"/>
+              <a:rPr lang="en-US"/>
               <a:t>Third level</a:t>
             </a:r>
           </a:p>
           <a:p>
             <a:pPr lvl="3"/>
             <a:r>
-              <a:rPr lang="en-US" smtClean="0"/>
+              <a:rPr lang="en-US"/>
               <a:t>Fourth level</a:t>
             </a:r>
           </a:p>
           <a:p>
             <a:pPr lvl="4"/>
             <a:r>
-              <a:rPr lang="en-US" smtClean="0"/>
+              <a:rPr lang="en-US"/>
               <a:t>Fifth level</a:t>
             </a:r>
             <a:endParaRPr lang="en-GB"/>
@@ -1246,7 +1347,7 @@
           <a:p>
             <a:fld id="{4C769064-28F3-4829-9F80-93AB9647D7ED}" type="datetimeFigureOut">
               <a:rPr lang="en-GB" smtClean="0"/>
-              <a:t>25/02/2023</a:t>
+              <a:t>28/02/2023</a:t>
             </a:fld>
             <a:endParaRPr lang="en-GB"/>
           </a:p>
@@ -1345,7 +1446,7 @@
           <a:lstStyle/>
           <a:p>
             <a:r>
-              <a:rPr lang="en-US" smtClean="0"/>
+              <a:rPr lang="en-US"/>
               <a:t>Click to edit Master title style</a:t>
             </a:r>
             <a:endParaRPr lang="en-GB"/>
@@ -1411,7 +1512,7 @@
           <a:p>
             <a:pPr lvl="0"/>
             <a:r>
-              <a:rPr lang="en-US" smtClean="0"/>
+              <a:rPr lang="en-US"/>
               <a:t>Edit Master text styles</a:t>
             </a:r>
           </a:p>
@@ -1439,35 +1540,35 @@
           <a:p>
             <a:pPr lvl="0"/>
             <a:r>
-              <a:rPr lang="en-US" smtClean="0"/>
+              <a:rPr lang="en-US"/>
               <a:t>Edit Master text styles</a:t>
             </a:r>
           </a:p>
           <a:p>
             <a:pPr lvl="1"/>
             <a:r>
-              <a:rPr lang="en-US" smtClean="0"/>
+              <a:rPr lang="en-US"/>
               <a:t>Second level</a:t>
             </a:r>
           </a:p>
           <a:p>
             <a:pPr lvl="2"/>
             <a:r>
-              <a:rPr lang="en-US" smtClean="0"/>
+              <a:rPr lang="en-US"/>
               <a:t>Third level</a:t>
             </a:r>
           </a:p>
           <a:p>
             <a:pPr lvl="3"/>
             <a:r>
-              <a:rPr lang="en-US" smtClean="0"/>
+              <a:rPr lang="en-US"/>
               <a:t>Fourth level</a:t>
             </a:r>
           </a:p>
           <a:p>
             <a:pPr lvl="4"/>
             <a:r>
-              <a:rPr lang="en-US" smtClean="0"/>
+              <a:rPr lang="en-US"/>
               <a:t>Fifth level</a:t>
             </a:r>
             <a:endParaRPr lang="en-GB"/>
@@ -1533,7 +1634,7 @@
           <a:p>
             <a:pPr lvl="0"/>
             <a:r>
-              <a:rPr lang="en-US" smtClean="0"/>
+              <a:rPr lang="en-US"/>
               <a:t>Edit Master text styles</a:t>
             </a:r>
           </a:p>
@@ -1561,35 +1662,35 @@
           <a:p>
             <a:pPr lvl="0"/>
             <a:r>
-              <a:rPr lang="en-US" smtClean="0"/>
+              <a:rPr lang="en-US"/>
               <a:t>Edit Master text styles</a:t>
             </a:r>
           </a:p>
           <a:p>
             <a:pPr lvl="1"/>
             <a:r>
-              <a:rPr lang="en-US" smtClean="0"/>
+              <a:rPr lang="en-US"/>
               <a:t>Second level</a:t>
             </a:r>
           </a:p>
           <a:p>
             <a:pPr lvl="2"/>
             <a:r>
-              <a:rPr lang="en-US" smtClean="0"/>
+              <a:rPr lang="en-US"/>
               <a:t>Third level</a:t>
             </a:r>
           </a:p>
           <a:p>
             <a:pPr lvl="3"/>
             <a:r>
-              <a:rPr lang="en-US" smtClean="0"/>
+              <a:rPr lang="en-US"/>
               <a:t>Fourth level</a:t>
             </a:r>
           </a:p>
           <a:p>
             <a:pPr lvl="4"/>
             <a:r>
-              <a:rPr lang="en-US" smtClean="0"/>
+              <a:rPr lang="en-US"/>
               <a:t>Fifth level</a:t>
             </a:r>
             <a:endParaRPr lang="en-GB"/>
@@ -1613,7 +1714,7 @@
           <a:p>
             <a:fld id="{4C769064-28F3-4829-9F80-93AB9647D7ED}" type="datetimeFigureOut">
               <a:rPr lang="en-GB" smtClean="0"/>
-              <a:t>25/02/2023</a:t>
+              <a:t>28/02/2023</a:t>
             </a:fld>
             <a:endParaRPr lang="en-GB"/>
           </a:p>
@@ -1707,7 +1808,7 @@
           <a:lstStyle/>
           <a:p>
             <a:r>
-              <a:rPr lang="en-US" smtClean="0"/>
+              <a:rPr lang="en-US"/>
               <a:t>Click to edit Master title style</a:t>
             </a:r>
             <a:endParaRPr lang="en-GB"/>
@@ -1731,7 +1832,7 @@
           <a:p>
             <a:fld id="{4C769064-28F3-4829-9F80-93AB9647D7ED}" type="datetimeFigureOut">
               <a:rPr lang="en-GB" smtClean="0"/>
-              <a:t>25/02/2023</a:t>
+              <a:t>28/02/2023</a:t>
             </a:fld>
             <a:endParaRPr lang="en-GB"/>
           </a:p>
@@ -1826,7 +1927,7 @@
           <a:p>
             <a:fld id="{4C769064-28F3-4829-9F80-93AB9647D7ED}" type="datetimeFigureOut">
               <a:rPr lang="en-GB" smtClean="0"/>
-              <a:t>25/02/2023</a:t>
+              <a:t>28/02/2023</a:t>
             </a:fld>
             <a:endParaRPr lang="en-GB"/>
           </a:p>
@@ -1929,7 +2030,7 @@
           </a:lstStyle>
           <a:p>
             <a:r>
-              <a:rPr lang="en-US" smtClean="0"/>
+              <a:rPr lang="en-US"/>
               <a:t>Click to edit Master title style</a:t>
             </a:r>
             <a:endParaRPr lang="en-GB"/>
@@ -1986,35 +2087,35 @@
           <a:p>
             <a:pPr lvl="0"/>
             <a:r>
-              <a:rPr lang="en-US" smtClean="0"/>
+              <a:rPr lang="en-US"/>
               <a:t>Edit Master text styles</a:t>
             </a:r>
           </a:p>
           <a:p>
             <a:pPr lvl="1"/>
             <a:r>
-              <a:rPr lang="en-US" smtClean="0"/>
+              <a:rPr lang="en-US"/>
               <a:t>Second level</a:t>
             </a:r>
           </a:p>
           <a:p>
             <a:pPr lvl="2"/>
             <a:r>
-              <a:rPr lang="en-US" smtClean="0"/>
+              <a:rPr lang="en-US"/>
               <a:t>Third level</a:t>
             </a:r>
           </a:p>
           <a:p>
             <a:pPr lvl="3"/>
             <a:r>
-              <a:rPr lang="en-US" smtClean="0"/>
+              <a:rPr lang="en-US"/>
               <a:t>Fourth level</a:t>
             </a:r>
           </a:p>
           <a:p>
             <a:pPr lvl="4"/>
             <a:r>
-              <a:rPr lang="en-US" smtClean="0"/>
+              <a:rPr lang="en-US"/>
               <a:t>Fifth level</a:t>
             </a:r>
             <a:endParaRPr lang="en-GB"/>
@@ -2080,7 +2181,7 @@
           <a:p>
             <a:pPr lvl="0"/>
             <a:r>
-              <a:rPr lang="en-US" smtClean="0"/>
+              <a:rPr lang="en-US"/>
               <a:t>Edit Master text styles</a:t>
             </a:r>
           </a:p>
@@ -2103,7 +2204,7 @@
           <a:p>
             <a:fld id="{4C769064-28F3-4829-9F80-93AB9647D7ED}" type="datetimeFigureOut">
               <a:rPr lang="en-GB" smtClean="0"/>
-              <a:t>25/02/2023</a:t>
+              <a:t>28/02/2023</a:t>
             </a:fld>
             <a:endParaRPr lang="en-GB"/>
           </a:p>
@@ -2206,7 +2307,7 @@
           </a:lstStyle>
           <a:p>
             <a:r>
-              <a:rPr lang="en-US" smtClean="0"/>
+              <a:rPr lang="en-US"/>
               <a:t>Click to edit Master title style</a:t>
             </a:r>
             <a:endParaRPr lang="en-GB"/>
@@ -2333,7 +2434,7 @@
           <a:p>
             <a:pPr lvl="0"/>
             <a:r>
-              <a:rPr lang="en-US" smtClean="0"/>
+              <a:rPr lang="en-US"/>
               <a:t>Edit Master text styles</a:t>
             </a:r>
           </a:p>
@@ -2356,7 +2457,7 @@
           <a:p>
             <a:fld id="{4C769064-28F3-4829-9F80-93AB9647D7ED}" type="datetimeFigureOut">
               <a:rPr lang="en-GB" smtClean="0"/>
-              <a:t>25/02/2023</a:t>
+              <a:t>28/02/2023</a:t>
             </a:fld>
             <a:endParaRPr lang="en-GB"/>
           </a:p>
@@ -2465,7 +2566,7 @@
           <a:lstStyle/>
           <a:p>
             <a:r>
-              <a:rPr lang="en-US" smtClean="0"/>
+              <a:rPr lang="en-US"/>
               <a:t>Click to edit Master title style</a:t>
             </a:r>
             <a:endParaRPr lang="en-GB"/>
@@ -2499,35 +2600,35 @@
           <a:p>
             <a:pPr lvl="0"/>
             <a:r>
-              <a:rPr lang="en-US" smtClean="0"/>
+              <a:rPr lang="en-US"/>
               <a:t>Edit Master text styles</a:t>
             </a:r>
           </a:p>
           <a:p>
             <a:pPr lvl="1"/>
             <a:r>
-              <a:rPr lang="en-US" smtClean="0"/>
+              <a:rPr lang="en-US"/>
               <a:t>Second level</a:t>
             </a:r>
           </a:p>
           <a:p>
             <a:pPr lvl="2"/>
             <a:r>
-              <a:rPr lang="en-US" smtClean="0"/>
+              <a:rPr lang="en-US"/>
               <a:t>Third level</a:t>
             </a:r>
           </a:p>
           <a:p>
             <a:pPr lvl="3"/>
             <a:r>
-              <a:rPr lang="en-US" smtClean="0"/>
+              <a:rPr lang="en-US"/>
               <a:t>Fourth level</a:t>
             </a:r>
           </a:p>
           <a:p>
             <a:pPr lvl="4"/>
             <a:r>
-              <a:rPr lang="en-US" smtClean="0"/>
+              <a:rPr lang="en-US"/>
               <a:t>Fifth level</a:t>
             </a:r>
             <a:endParaRPr lang="en-GB"/>
@@ -2569,7 +2670,7 @@
           <a:p>
             <a:fld id="{4C769064-28F3-4829-9F80-93AB9647D7ED}" type="datetimeFigureOut">
               <a:rPr lang="en-GB" smtClean="0"/>
-              <a:t>25/02/2023</a:t>
+              <a:t>28/02/2023</a:t>
             </a:fld>
             <a:endParaRPr lang="en-GB"/>
           </a:p>
@@ -3085,7 +3186,7 @@
           <a:p>
             <a:pPr algn="ctr"/>
             <a:r>
-              <a:rPr lang="en-US" dirty="0" smtClean="0"/>
+              <a:rPr lang="en-US" dirty="0"/>
               <a:t>Copyright information</a:t>
             </a:r>
             <a:endParaRPr lang="en-GB" dirty="0"/>
@@ -3127,7 +3228,7 @@
           <a:p>
             <a:pPr algn="ctr"/>
             <a:r>
-              <a:rPr lang="en-US" dirty="0" smtClean="0"/>
+              <a:rPr lang="en-US" dirty="0"/>
               <a:t>Logo</a:t>
             </a:r>
             <a:endParaRPr lang="en-GB" dirty="0"/>
@@ -3157,7 +3258,7 @@
           <a:lstStyle/>
           <a:p>
             <a:r>
-              <a:rPr lang="en-US" dirty="0" smtClean="0"/>
+              <a:rPr lang="en-US" dirty="0"/>
               <a:t>Home      View Tournaments   …</a:t>
             </a:r>
             <a:endParaRPr lang="en-GB" dirty="0"/>
@@ -3199,7 +3300,7 @@
           <a:p>
             <a:pPr algn="ctr"/>
             <a:r>
-              <a:rPr lang="en-US" dirty="0" smtClean="0"/>
+              <a:rPr lang="en-US" dirty="0"/>
               <a:t>Login</a:t>
             </a:r>
             <a:endParaRPr lang="en-GB" dirty="0"/>
@@ -3341,14 +3442,14 @@
             <a:lstStyle/>
             <a:p>
               <a:r>
-                <a:rPr lang="en-US" dirty="0" smtClean="0"/>
+                <a:rPr lang="en-US" dirty="0"/>
                 <a:t>Welcome to …</a:t>
               </a:r>
               <a:br>
-                <a:rPr lang="en-US" dirty="0" smtClean="0"/>
+                <a:rPr lang="en-US" dirty="0"/>
               </a:br>
               <a:r>
-                <a:rPr lang="en-US" dirty="0" smtClean="0"/>
+                <a:rPr lang="en-US" dirty="0"/>
                 <a:t>About us info</a:t>
               </a:r>
               <a:endParaRPr lang="en-GB" dirty="0"/>
@@ -3366,13 +3467,6 @@
   <p:clrMapOvr>
     <a:masterClrMapping/>
   </p:clrMapOvr>
-  <p:timing>
-    <p:tnLst>
-      <p:par>
-        <p:cTn id="1" dur="indefinite" restart="never" nodeType="tmRoot"/>
-      </p:par>
-    </p:tnLst>
-  </p:timing>
 </p:sld>
 </file>
 
@@ -3504,7 +3598,7 @@
           <a:p>
             <a:pPr algn="ctr"/>
             <a:r>
-              <a:rPr lang="en-US" dirty="0" smtClean="0"/>
+              <a:rPr lang="en-US" dirty="0"/>
               <a:t>Copyright information</a:t>
             </a:r>
             <a:endParaRPr lang="en-GB" dirty="0"/>
@@ -3546,7 +3640,7 @@
           <a:p>
             <a:pPr algn="ctr"/>
             <a:r>
-              <a:rPr lang="en-US" dirty="0" smtClean="0"/>
+              <a:rPr lang="en-US" dirty="0"/>
               <a:t>Logo</a:t>
             </a:r>
             <a:endParaRPr lang="en-GB" dirty="0"/>
@@ -3576,7 +3670,7 @@
           <a:lstStyle/>
           <a:p>
             <a:r>
-              <a:rPr lang="en-US" dirty="0" smtClean="0"/>
+              <a:rPr lang="en-US" dirty="0"/>
               <a:t>Home      View Tournaments   …</a:t>
             </a:r>
             <a:endParaRPr lang="en-GB" dirty="0"/>
@@ -3618,7 +3712,7 @@
           <a:p>
             <a:pPr algn="ctr"/>
             <a:r>
-              <a:rPr lang="en-US" dirty="0" smtClean="0"/>
+              <a:rPr lang="en-US" dirty="0"/>
               <a:t>Login</a:t>
             </a:r>
             <a:endParaRPr lang="en-GB" dirty="0"/>
@@ -3750,7 +3844,7 @@
           <a:lstStyle/>
           <a:p>
             <a:r>
-              <a:rPr lang="en-US" sz="1400" dirty="0" smtClean="0">
+              <a:rPr lang="en-US" sz="1400" dirty="0">
                 <a:solidFill>
                   <a:schemeClr val="bg2"/>
                 </a:solidFill>
@@ -3758,14 +3852,14 @@
               <a:t>Welcome to …</a:t>
             </a:r>
             <a:br>
-              <a:rPr lang="en-US" sz="1400" dirty="0" smtClean="0">
+              <a:rPr lang="en-US" sz="1400" dirty="0">
                 <a:solidFill>
                   <a:schemeClr val="bg2"/>
                 </a:solidFill>
               </a:rPr>
             </a:br>
             <a:r>
-              <a:rPr lang="en-US" sz="1400" dirty="0" smtClean="0">
+              <a:rPr lang="en-US" sz="1400" dirty="0">
                 <a:solidFill>
                   <a:schemeClr val="bg2"/>
                 </a:solidFill>
@@ -3855,14 +3949,14 @@
             <a:lstStyle/>
             <a:p>
               <a:r>
-                <a:rPr lang="en-US" dirty="0" smtClean="0"/>
+                <a:rPr lang="en-US" dirty="0"/>
                 <a:t>Email:</a:t>
               </a:r>
               <a:br>
-                <a:rPr lang="en-US" dirty="0" smtClean="0"/>
+                <a:rPr lang="en-US" dirty="0"/>
               </a:br>
               <a:r>
-                <a:rPr lang="en-US" dirty="0" smtClean="0"/>
+                <a:rPr lang="en-US" dirty="0"/>
                 <a:t>Password:</a:t>
               </a:r>
               <a:endParaRPr lang="en-GB" dirty="0"/>
@@ -3904,7 +3998,7 @@
             <a:p>
               <a:pPr algn="ctr"/>
               <a:r>
-                <a:rPr lang="en-US" sz="900" dirty="0" smtClean="0"/>
+                <a:rPr lang="en-US" sz="900" dirty="0"/>
                 <a:t>Enter Text</a:t>
               </a:r>
               <a:endParaRPr lang="en-GB" sz="900" dirty="0"/>
@@ -3946,7 +4040,7 @@
             <a:p>
               <a:pPr algn="ctr"/>
               <a:r>
-                <a:rPr lang="en-US" sz="900" dirty="0" smtClean="0"/>
+                <a:rPr lang="en-US" sz="900" dirty="0"/>
                 <a:t>Enter Text</a:t>
               </a:r>
               <a:endParaRPr lang="en-GB" sz="900" dirty="0"/>
@@ -4039,13 +4133,6 @@
   <p:clrMapOvr>
     <a:masterClrMapping/>
   </p:clrMapOvr>
-  <p:timing>
-    <p:tnLst>
-      <p:par>
-        <p:cTn id="1" dur="indefinite" restart="never" nodeType="tmRoot"/>
-      </p:par>
-    </p:tnLst>
-  </p:timing>
 </p:sld>
 </file>
 
@@ -4177,7 +4264,7 @@
           <a:p>
             <a:pPr algn="ctr"/>
             <a:r>
-              <a:rPr lang="en-US" dirty="0" smtClean="0"/>
+              <a:rPr lang="en-US" dirty="0"/>
               <a:t>Copyright information</a:t>
             </a:r>
             <a:endParaRPr lang="en-GB" dirty="0"/>
@@ -4219,7 +4306,7 @@
           <a:p>
             <a:pPr algn="ctr"/>
             <a:r>
-              <a:rPr lang="en-US" dirty="0" smtClean="0"/>
+              <a:rPr lang="en-US" dirty="0"/>
               <a:t>Logo</a:t>
             </a:r>
             <a:endParaRPr lang="en-GB" dirty="0"/>
@@ -4249,7 +4336,7 @@
           <a:lstStyle/>
           <a:p>
             <a:r>
-              <a:rPr lang="en-US" dirty="0" smtClean="0"/>
+              <a:rPr lang="en-US" dirty="0"/>
               <a:t>Home      View Tournaments   …</a:t>
             </a:r>
             <a:endParaRPr lang="en-GB" dirty="0"/>
@@ -4291,7 +4378,7 @@
           <a:p>
             <a:pPr algn="ctr"/>
             <a:r>
-              <a:rPr lang="en-US" dirty="0" smtClean="0"/>
+              <a:rPr lang="en-US" dirty="0"/>
               <a:t>Login</a:t>
             </a:r>
             <a:endParaRPr lang="en-GB" dirty="0"/>
@@ -4486,7 +4573,7 @@
             <a:lstStyle/>
             <a:p>
               <a:r>
-                <a:rPr lang="en-US" sz="1400" dirty="0" smtClean="0"/>
+                <a:rPr lang="en-US" sz="1400" dirty="0"/>
                 <a:t>Tournament1 info</a:t>
               </a:r>
               <a:endParaRPr lang="en-GB" sz="1400" dirty="0"/>
@@ -4528,7 +4615,7 @@
             <a:p>
               <a:pPr algn="ctr"/>
               <a:r>
-                <a:rPr lang="en-US" sz="1050" dirty="0" smtClean="0"/>
+                <a:rPr lang="en-US" sz="1050" dirty="0"/>
                 <a:t>View Match Information</a:t>
               </a:r>
               <a:endParaRPr lang="en-GB" sz="1050" dirty="0"/>
@@ -4570,7 +4657,7 @@
             <a:p>
               <a:pPr algn="ctr"/>
               <a:r>
-                <a:rPr lang="en-US" sz="1000" dirty="0" smtClean="0"/>
+                <a:rPr lang="en-US" sz="1000" dirty="0"/>
                 <a:t>Add Match Data (If Admin)</a:t>
               </a:r>
               <a:endParaRPr lang="en-GB" sz="1000" dirty="0"/>
@@ -4766,7 +4853,7 @@
             <a:lstStyle/>
             <a:p>
               <a:r>
-                <a:rPr lang="en-US" sz="1400" dirty="0" smtClean="0"/>
+                <a:rPr lang="en-US" sz="1400" dirty="0"/>
                 <a:t>Tournament2 info</a:t>
               </a:r>
               <a:endParaRPr lang="en-GB" sz="1400" dirty="0"/>
@@ -4808,7 +4895,7 @@
             <a:p>
               <a:pPr algn="ctr"/>
               <a:r>
-                <a:rPr lang="en-US" sz="1050" dirty="0" smtClean="0"/>
+                <a:rPr lang="en-US" sz="1050" dirty="0"/>
                 <a:t>View Match Information</a:t>
               </a:r>
               <a:endParaRPr lang="en-GB" sz="1050" dirty="0"/>
@@ -4850,7 +4937,7 @@
             <a:p>
               <a:pPr algn="ctr"/>
               <a:r>
-                <a:rPr lang="en-US" sz="1000" dirty="0" smtClean="0"/>
+                <a:rPr lang="en-US" sz="1000" dirty="0"/>
                 <a:t>Add Match Data (If Admin)</a:t>
               </a:r>
               <a:endParaRPr lang="en-GB" sz="1000" dirty="0"/>
@@ -5046,7 +5133,7 @@
             <a:lstStyle/>
             <a:p>
               <a:r>
-                <a:rPr lang="en-US" sz="1400" dirty="0" smtClean="0"/>
+                <a:rPr lang="en-US" sz="1400" dirty="0"/>
                 <a:t>Tournament3 info</a:t>
               </a:r>
               <a:endParaRPr lang="en-GB" sz="1400" dirty="0"/>
@@ -5088,7 +5175,7 @@
             <a:p>
               <a:pPr algn="ctr"/>
               <a:r>
-                <a:rPr lang="en-US" sz="1050" dirty="0" smtClean="0"/>
+                <a:rPr lang="en-US" sz="1050" dirty="0"/>
                 <a:t>View Match Information</a:t>
               </a:r>
               <a:endParaRPr lang="en-GB" sz="1050" dirty="0"/>
@@ -5130,7 +5217,7 @@
             <a:p>
               <a:pPr algn="ctr"/>
               <a:r>
-                <a:rPr lang="en-US" sz="1000" dirty="0" smtClean="0"/>
+                <a:rPr lang="en-US" sz="1000" dirty="0"/>
                 <a:t>Add Match Data (If Admin)</a:t>
               </a:r>
               <a:endParaRPr lang="en-GB" sz="1000" dirty="0"/>
@@ -5326,7 +5413,7 @@
             <a:lstStyle/>
             <a:p>
               <a:r>
-                <a:rPr lang="en-US" sz="1400" dirty="0" smtClean="0"/>
+                <a:rPr lang="en-US" sz="1400" dirty="0"/>
                 <a:t>Tournament4 info</a:t>
               </a:r>
               <a:endParaRPr lang="en-GB" sz="1400" dirty="0"/>
@@ -5368,7 +5455,7 @@
             <a:p>
               <a:pPr algn="ctr"/>
               <a:r>
-                <a:rPr lang="en-US" sz="1050" dirty="0" smtClean="0"/>
+                <a:rPr lang="en-US" sz="1050" dirty="0"/>
                 <a:t>View Match Information</a:t>
               </a:r>
               <a:endParaRPr lang="en-GB" sz="1050" dirty="0"/>
@@ -5410,7 +5497,7 @@
             <a:p>
               <a:pPr algn="ctr"/>
               <a:r>
-                <a:rPr lang="en-US" sz="1000" dirty="0" smtClean="0"/>
+                <a:rPr lang="en-US" sz="1000" dirty="0"/>
                 <a:t>Add Match Data (If Admin)</a:t>
               </a:r>
               <a:endParaRPr lang="en-GB" sz="1000" dirty="0"/>
@@ -5559,7 +5646,7 @@
           <a:p>
             <a:pPr algn="ctr"/>
             <a:r>
-              <a:rPr lang="en-US" dirty="0" smtClean="0"/>
+              <a:rPr lang="en-US" dirty="0"/>
               <a:t>Copyright information</a:t>
             </a:r>
             <a:endParaRPr lang="en-GB" dirty="0"/>
@@ -5601,7 +5688,7 @@
           <a:p>
             <a:pPr algn="ctr"/>
             <a:r>
-              <a:rPr lang="en-US" dirty="0" smtClean="0"/>
+              <a:rPr lang="en-US" dirty="0"/>
               <a:t>Logo</a:t>
             </a:r>
             <a:endParaRPr lang="en-GB" dirty="0"/>
@@ -5631,7 +5718,7 @@
           <a:lstStyle/>
           <a:p>
             <a:r>
-              <a:rPr lang="en-US" dirty="0" smtClean="0"/>
+              <a:rPr lang="en-US" dirty="0"/>
               <a:t>Home      View Tournaments   …</a:t>
             </a:r>
             <a:endParaRPr lang="en-GB" dirty="0"/>
@@ -5673,7 +5760,7 @@
           <a:p>
             <a:pPr algn="ctr"/>
             <a:r>
-              <a:rPr lang="en-US" dirty="0" smtClean="0"/>
+              <a:rPr lang="en-US" dirty="0"/>
               <a:t>Login</a:t>
             </a:r>
             <a:endParaRPr lang="en-GB" dirty="0"/>
@@ -5715,7 +5802,7 @@
           <a:p>
             <a:pPr algn="ctr"/>
             <a:r>
-              <a:rPr lang="en-US" dirty="0" smtClean="0"/>
+              <a:rPr lang="en-US" dirty="0"/>
               <a:t>Display tournament bracket</a:t>
             </a:r>
             <a:endParaRPr lang="en-GB" dirty="0"/>
@@ -5757,7 +5844,7 @@
           <a:p>
             <a:pPr algn="ctr"/>
             <a:r>
-              <a:rPr lang="en-US" dirty="0" smtClean="0"/>
+              <a:rPr lang="en-US" dirty="0"/>
               <a:t>Men/Women</a:t>
             </a:r>
             <a:endParaRPr lang="en-GB" dirty="0"/>
@@ -5799,7 +5886,7 @@
           <a:p>
             <a:pPr algn="ctr"/>
             <a:r>
-              <a:rPr lang="en-US" dirty="0" smtClean="0"/>
+              <a:rPr lang="en-US" dirty="0"/>
               <a:t>Display Match Information</a:t>
             </a:r>
             <a:endParaRPr lang="en-GB" dirty="0"/>
@@ -5844,7 +5931,7 @@
         </p:nvSpPr>
         <p:spPr>
           <a:xfrm>
-            <a:off x="116484" y="69890"/>
+            <a:off x="116484" y="23237"/>
             <a:ext cx="11939618" cy="6692011"/>
           </a:xfrm>
           <a:prstGeom prst="rect">
@@ -5947,7 +6034,7 @@
           <a:p>
             <a:pPr algn="ctr"/>
             <a:r>
-              <a:rPr lang="en-US" dirty="0" smtClean="0"/>
+              <a:rPr lang="en-US" dirty="0"/>
               <a:t>Copyright information</a:t>
             </a:r>
             <a:endParaRPr lang="en-GB" dirty="0"/>
@@ -5989,7 +6076,7 @@
           <a:p>
             <a:pPr algn="ctr"/>
             <a:r>
-              <a:rPr lang="en-US" dirty="0" smtClean="0"/>
+              <a:rPr lang="en-US" dirty="0"/>
               <a:t>Logo</a:t>
             </a:r>
             <a:endParaRPr lang="en-GB" dirty="0"/>
@@ -6019,7 +6106,7 @@
           <a:lstStyle/>
           <a:p>
             <a:r>
-              <a:rPr lang="en-US" dirty="0" smtClean="0"/>
+              <a:rPr lang="en-US" dirty="0"/>
               <a:t>Home      View Tournaments   …</a:t>
             </a:r>
             <a:endParaRPr lang="en-GB" dirty="0"/>
@@ -6061,7 +6148,7 @@
           <a:p>
             <a:pPr algn="ctr"/>
             <a:r>
-              <a:rPr lang="en-US" dirty="0" smtClean="0"/>
+              <a:rPr lang="en-US" dirty="0"/>
               <a:t>Login</a:t>
             </a:r>
             <a:endParaRPr lang="en-GB" dirty="0"/>
@@ -6076,7 +6163,7 @@
         </p:nvSpPr>
         <p:spPr>
           <a:xfrm>
-            <a:off x="535828" y="1248089"/>
+            <a:off x="526121" y="1230966"/>
             <a:ext cx="8503336" cy="4472989"/>
           </a:xfrm>
           <a:prstGeom prst="rect">
@@ -6114,7 +6201,7 @@
         </p:nvSpPr>
         <p:spPr>
           <a:xfrm>
-            <a:off x="3908042" y="3142157"/>
+            <a:off x="3925068" y="1432005"/>
             <a:ext cx="1624952" cy="547475"/>
           </a:xfrm>
           <a:prstGeom prst="roundRect">
@@ -6141,8 +6228,8 @@
           <a:p>
             <a:pPr algn="ctr"/>
             <a:r>
-              <a:rPr lang="en-US" dirty="0" smtClean="0"/>
-              <a:t>Upload match CSV</a:t>
+              <a:rPr lang="en-US" dirty="0"/>
+              <a:t>Upload Season</a:t>
             </a:r>
             <a:endParaRPr lang="en-GB" dirty="0"/>
           </a:p>
@@ -6156,8 +6243,8 @@
         </p:nvSpPr>
         <p:spPr>
           <a:xfrm>
-            <a:off x="9219715" y="1248089"/>
-            <a:ext cx="2521880" cy="4472989"/>
+            <a:off x="9358604" y="1230966"/>
+            <a:ext cx="2307275" cy="3680211"/>
           </a:xfrm>
           <a:prstGeom prst="rect">
             <a:avLst/>
@@ -6183,26 +6270,262 @@
           <a:p>
             <a:pPr algn="ctr"/>
             <a:r>
-              <a:rPr lang="en-US" dirty="0" smtClean="0"/>
+              <a:rPr lang="en-US" dirty="0"/>
               <a:t>Message Box </a:t>
             </a:r>
             <a:br>
-              <a:rPr lang="en-US" dirty="0" smtClean="0"/>
+              <a:rPr lang="en-US" dirty="0"/>
             </a:br>
             <a:r>
-              <a:rPr lang="en-US" dirty="0" smtClean="0"/>
-              <a:t>(Success or Error</a:t>
-            </a:r>
-            <a:r>
-              <a:rPr lang="en-US" dirty="0" smtClean="0"/>
-              <a:t>)</a:t>
+              <a:rPr lang="en-US" dirty="0"/>
+              <a:t>(Success or Error)</a:t>
             </a:r>
             <a:br>
-              <a:rPr lang="en-US" dirty="0" smtClean="0"/>
+              <a:rPr lang="en-US" dirty="0"/>
             </a:br>
             <a:r>
-              <a:rPr lang="en-US" dirty="0" smtClean="0"/>
+              <a:rPr lang="en-US" dirty="0"/>
               <a:t>TBD</a:t>
+            </a:r>
+            <a:endParaRPr lang="en-GB" dirty="0"/>
+          </a:p>
+        </p:txBody>
+      </p:sp>
+      <p:sp>
+        <p:nvSpPr>
+          <p:cNvPr id="2" name="Rounded Rectangle 10">
+            <a:extLst>
+              <a:ext uri="{FF2B5EF4-FFF2-40B4-BE49-F238E27FC236}">
+                <a16:creationId xmlns:a16="http://schemas.microsoft.com/office/drawing/2014/main" id="{D0F5EE76-7DA8-4462-C716-C4DC7AD19D01}"/>
+              </a:ext>
+            </a:extLst>
+          </p:cNvPr>
+          <p:cNvSpPr/>
+          <p:nvPr/>
+        </p:nvSpPr>
+        <p:spPr>
+          <a:xfrm>
+            <a:off x="9356138" y="5163676"/>
+            <a:ext cx="2307275" cy="520403"/>
+          </a:xfrm>
+          <a:prstGeom prst="roundRect">
+            <a:avLst/>
+          </a:prstGeom>
+        </p:spPr>
+        <p:style>
+          <a:lnRef idx="2">
+            <a:schemeClr val="dk1"/>
+          </a:lnRef>
+          <a:fillRef idx="1">
+            <a:schemeClr val="lt1"/>
+          </a:fillRef>
+          <a:effectRef idx="0">
+            <a:schemeClr val="dk1"/>
+          </a:effectRef>
+          <a:fontRef idx="minor">
+            <a:schemeClr val="dk1"/>
+          </a:fontRef>
+        </p:style>
+        <p:txBody>
+          <a:bodyPr rtlCol="0" anchor="ctr"/>
+          <a:lstStyle/>
+          <a:p>
+            <a:pPr algn="ctr"/>
+            <a:r>
+              <a:rPr lang="en-US" dirty="0"/>
+              <a:t>Add new user</a:t>
+            </a:r>
+            <a:endParaRPr lang="en-GB" dirty="0"/>
+          </a:p>
+        </p:txBody>
+      </p:sp>
+      <p:sp>
+        <p:nvSpPr>
+          <p:cNvPr id="10" name="Rounded Rectangle 10">
+            <a:extLst>
+              <a:ext uri="{FF2B5EF4-FFF2-40B4-BE49-F238E27FC236}">
+                <a16:creationId xmlns:a16="http://schemas.microsoft.com/office/drawing/2014/main" id="{F187ECB0-C4DF-F9C6-AD37-50284408D5A9}"/>
+              </a:ext>
+            </a:extLst>
+          </p:cNvPr>
+          <p:cNvSpPr/>
+          <p:nvPr/>
+        </p:nvSpPr>
+        <p:spPr>
+          <a:xfrm>
+            <a:off x="3925068" y="2224614"/>
+            <a:ext cx="1624952" cy="547475"/>
+          </a:xfrm>
+          <a:prstGeom prst="roundRect">
+            <a:avLst/>
+          </a:prstGeom>
+        </p:spPr>
+        <p:style>
+          <a:lnRef idx="2">
+            <a:schemeClr val="dk1"/>
+          </a:lnRef>
+          <a:fillRef idx="1">
+            <a:schemeClr val="lt1"/>
+          </a:fillRef>
+          <a:effectRef idx="0">
+            <a:schemeClr val="dk1"/>
+          </a:effectRef>
+          <a:fontRef idx="minor">
+            <a:schemeClr val="dk1"/>
+          </a:fontRef>
+        </p:style>
+        <p:txBody>
+          <a:bodyPr rtlCol="0" anchor="ctr"/>
+          <a:lstStyle/>
+          <a:p>
+            <a:pPr algn="ctr"/>
+            <a:r>
+              <a:rPr lang="en-US" dirty="0"/>
+              <a:t>Upload Players</a:t>
+            </a:r>
+            <a:endParaRPr lang="en-GB" dirty="0"/>
+          </a:p>
+        </p:txBody>
+      </p:sp>
+      <p:sp>
+        <p:nvSpPr>
+          <p:cNvPr id="12" name="Rounded Rectangle 10">
+            <a:extLst>
+              <a:ext uri="{FF2B5EF4-FFF2-40B4-BE49-F238E27FC236}">
+                <a16:creationId xmlns:a16="http://schemas.microsoft.com/office/drawing/2014/main" id="{609F73AA-5083-DB21-3A6C-047B2C265A02}"/>
+              </a:ext>
+            </a:extLst>
+          </p:cNvPr>
+          <p:cNvSpPr/>
+          <p:nvPr/>
+        </p:nvSpPr>
+        <p:spPr>
+          <a:xfrm>
+            <a:off x="3925068" y="3071071"/>
+            <a:ext cx="1624952" cy="547475"/>
+          </a:xfrm>
+          <a:prstGeom prst="roundRect">
+            <a:avLst/>
+          </a:prstGeom>
+        </p:spPr>
+        <p:style>
+          <a:lnRef idx="2">
+            <a:schemeClr val="dk1"/>
+          </a:lnRef>
+          <a:fillRef idx="1">
+            <a:schemeClr val="lt1"/>
+          </a:fillRef>
+          <a:effectRef idx="0">
+            <a:schemeClr val="dk1"/>
+          </a:effectRef>
+          <a:fontRef idx="minor">
+            <a:schemeClr val="dk1"/>
+          </a:fontRef>
+        </p:style>
+        <p:txBody>
+          <a:bodyPr rtlCol="0" anchor="ctr"/>
+          <a:lstStyle/>
+          <a:p>
+            <a:pPr algn="ctr"/>
+            <a:r>
+              <a:rPr lang="en-US" dirty="0"/>
+              <a:t>Upload Prize Money</a:t>
+            </a:r>
+            <a:endParaRPr lang="en-GB" dirty="0"/>
+          </a:p>
+        </p:txBody>
+      </p:sp>
+      <p:sp>
+        <p:nvSpPr>
+          <p:cNvPr id="14" name="Rounded Rectangle 10">
+            <a:extLst>
+              <a:ext uri="{FF2B5EF4-FFF2-40B4-BE49-F238E27FC236}">
+                <a16:creationId xmlns:a16="http://schemas.microsoft.com/office/drawing/2014/main" id="{F76AB3CF-E280-38EF-B09F-769CCF414B0A}"/>
+              </a:ext>
+            </a:extLst>
+          </p:cNvPr>
+          <p:cNvSpPr/>
+          <p:nvPr/>
+        </p:nvSpPr>
+        <p:spPr>
+          <a:xfrm>
+            <a:off x="3925068" y="4763985"/>
+            <a:ext cx="1624952" cy="547475"/>
+          </a:xfrm>
+          <a:prstGeom prst="roundRect">
+            <a:avLst/>
+          </a:prstGeom>
+        </p:spPr>
+        <p:style>
+          <a:lnRef idx="2">
+            <a:schemeClr val="dk1"/>
+          </a:lnRef>
+          <a:fillRef idx="1">
+            <a:schemeClr val="lt1"/>
+          </a:fillRef>
+          <a:effectRef idx="0">
+            <a:schemeClr val="dk1"/>
+          </a:effectRef>
+          <a:fontRef idx="minor">
+            <a:schemeClr val="dk1"/>
+          </a:fontRef>
+        </p:style>
+        <p:txBody>
+          <a:bodyPr rtlCol="0" anchor="ctr"/>
+          <a:lstStyle/>
+          <a:p>
+            <a:pPr algn="ctr"/>
+            <a:r>
+              <a:rPr lang="en-US" dirty="0"/>
+              <a:t>Submit</a:t>
+            </a:r>
+            <a:endParaRPr lang="en-GB" dirty="0"/>
+          </a:p>
+        </p:txBody>
+      </p:sp>
+      <p:sp>
+        <p:nvSpPr>
+          <p:cNvPr id="15" name="Rounded Rectangle 10">
+            <a:extLst>
+              <a:ext uri="{FF2B5EF4-FFF2-40B4-BE49-F238E27FC236}">
+                <a16:creationId xmlns:a16="http://schemas.microsoft.com/office/drawing/2014/main" id="{92FC55FF-963D-1D8B-77AF-6C197F3B4455}"/>
+              </a:ext>
+            </a:extLst>
+          </p:cNvPr>
+          <p:cNvSpPr/>
+          <p:nvPr/>
+        </p:nvSpPr>
+        <p:spPr>
+          <a:xfrm>
+            <a:off x="3925068" y="3917528"/>
+            <a:ext cx="1624952" cy="547475"/>
+          </a:xfrm>
+          <a:prstGeom prst="roundRect">
+            <a:avLst/>
+          </a:prstGeom>
+        </p:spPr>
+        <p:style>
+          <a:lnRef idx="2">
+            <a:schemeClr val="dk1"/>
+          </a:lnRef>
+          <a:fillRef idx="1">
+            <a:schemeClr val="lt1"/>
+          </a:fillRef>
+          <a:effectRef idx="0">
+            <a:schemeClr val="dk1"/>
+          </a:effectRef>
+          <a:fontRef idx="minor">
+            <a:schemeClr val="dk1"/>
+          </a:fontRef>
+        </p:style>
+        <p:txBody>
+          <a:bodyPr rtlCol="0" anchor="ctr"/>
+          <a:lstStyle/>
+          <a:p>
+            <a:pPr algn="ctr"/>
+            <a:r>
+              <a:rPr lang="en-US" dirty="0"/>
+              <a:t>Upload Matches</a:t>
             </a:r>
             <a:endParaRPr lang="en-GB" dirty="0"/>
           </a:p>
@@ -6349,7 +6672,7 @@
           <a:p>
             <a:pPr algn="ctr"/>
             <a:r>
-              <a:rPr lang="en-US" dirty="0" smtClean="0"/>
+              <a:rPr lang="en-US" dirty="0"/>
               <a:t>Copyright information</a:t>
             </a:r>
             <a:endParaRPr lang="en-GB" dirty="0"/>
@@ -6391,7 +6714,7 @@
           <a:p>
             <a:pPr algn="ctr"/>
             <a:r>
-              <a:rPr lang="en-US" dirty="0" smtClean="0"/>
+              <a:rPr lang="en-US" dirty="0"/>
               <a:t>Logo</a:t>
             </a:r>
             <a:endParaRPr lang="en-GB" dirty="0"/>
@@ -6421,7 +6744,7 @@
           <a:lstStyle/>
           <a:p>
             <a:r>
-              <a:rPr lang="en-US" dirty="0" smtClean="0"/>
+              <a:rPr lang="en-US" dirty="0"/>
               <a:t>Home      View Tournaments   …</a:t>
             </a:r>
             <a:endParaRPr lang="en-GB" dirty="0"/>
@@ -6463,7 +6786,7 @@
           <a:p>
             <a:pPr algn="ctr"/>
             <a:r>
-              <a:rPr lang="en-US" dirty="0" smtClean="0"/>
+              <a:rPr lang="en-US" dirty="0"/>
               <a:t>Login</a:t>
             </a:r>
             <a:endParaRPr lang="en-GB" dirty="0"/>
@@ -6505,22 +6828,22 @@
           <a:p>
             <a:pPr algn="ctr"/>
             <a:r>
-              <a:rPr lang="en-US" dirty="0" smtClean="0"/>
+              <a:rPr lang="en-US" dirty="0"/>
               <a:t>Add season form</a:t>
             </a:r>
             <a:br>
-              <a:rPr lang="en-US" dirty="0" smtClean="0"/>
+              <a:rPr lang="en-US" dirty="0"/>
             </a:br>
             <a:r>
-              <a:rPr lang="en-US" dirty="0" smtClean="0"/>
+              <a:rPr lang="en-US" dirty="0"/>
               <a:t>(</a:t>
             </a:r>
             <a:r>
-              <a:rPr lang="en-US" dirty="0" err="1" smtClean="0"/>
+              <a:rPr lang="en-US" dirty="0" err="1"/>
               <a:t>prize,ranking</a:t>
             </a:r>
             <a:r>
-              <a:rPr lang="en-US" dirty="0" smtClean="0"/>
+              <a:rPr lang="en-US" dirty="0"/>
               <a:t> points &amp; players)</a:t>
             </a:r>
             <a:endParaRPr lang="en-GB" dirty="0"/>
@@ -6562,25 +6885,21 @@
           <a:p>
             <a:pPr algn="ctr"/>
             <a:r>
-              <a:rPr lang="en-US" dirty="0" smtClean="0"/>
+              <a:rPr lang="en-US" dirty="0"/>
               <a:t>Message Box </a:t>
             </a:r>
             <a:br>
-              <a:rPr lang="en-US" dirty="0" smtClean="0"/>
+              <a:rPr lang="en-US" dirty="0"/>
             </a:br>
             <a:r>
-              <a:rPr lang="en-US" dirty="0" smtClean="0"/>
-              <a:t>(Success or Error</a:t>
-            </a:r>
-            <a:r>
-              <a:rPr lang="en-US" dirty="0" smtClean="0"/>
-              <a:t>)</a:t>
+              <a:rPr lang="en-US" dirty="0"/>
+              <a:t>(Success or Error)</a:t>
             </a:r>
           </a:p>
           <a:p>
             <a:pPr algn="ctr"/>
             <a:r>
-              <a:rPr lang="en-US" dirty="0" smtClean="0"/>
+              <a:rPr lang="en-US" dirty="0"/>
               <a:t>TBD</a:t>
             </a:r>
             <a:endParaRPr lang="en-GB" dirty="0"/>

</xml_diff>